<commit_message>
Add step to introduce usage of messaging
</commit_message>
<xml_diff>
--- a/Java-Starter.pptx
+++ b/Java-Starter.pptx
@@ -5,7 +5,7 @@
     <p:sldMasterId id="2147483648" r:id="rId1"/>
   </p:sldMasterIdLst>
   <p:notesMasterIdLst>
-    <p:notesMasterId r:id="rId55"/>
+    <p:notesMasterId r:id="rId57"/>
   </p:notesMasterIdLst>
   <p:sldIdLst>
     <p:sldId id="256" r:id="rId2"/>
@@ -60,7 +60,9 @@
     <p:sldId id="324" r:id="rId51"/>
     <p:sldId id="305" r:id="rId52"/>
     <p:sldId id="306" r:id="rId53"/>
-    <p:sldId id="315" r:id="rId54"/>
+    <p:sldId id="339" r:id="rId54"/>
+    <p:sldId id="340" r:id="rId55"/>
+    <p:sldId id="315" r:id="rId56"/>
   </p:sldIdLst>
   <p:sldSz cx="12192000" cy="6858000"/>
   <p:notesSz cx="6858000" cy="9144000"/>
@@ -249,7 +251,7 @@
           <a:p>
             <a:fld id="{64D387BD-2FDA-4640-824D-9ADFD7023C00}" type="datetimeFigureOut">
               <a:rPr lang="de-DE" smtClean="0"/>
-              <a:t>07.01.25</a:t>
+              <a:t>05.02.2025</a:t>
             </a:fld>
             <a:endParaRPr lang="de-DE"/>
           </a:p>
@@ -834,7 +836,7 @@
           <a:p>
             <a:fld id="{D504FEAC-1E62-0E47-82AE-5BB4BD139FFA}" type="datetimeFigureOut">
               <a:rPr lang="de-DE" smtClean="0"/>
-              <a:t>07.01.25</a:t>
+              <a:t>05.02.2025</a:t>
             </a:fld>
             <a:endParaRPr lang="de-DE"/>
           </a:p>
@@ -1032,7 +1034,7 @@
           <a:p>
             <a:fld id="{D504FEAC-1E62-0E47-82AE-5BB4BD139FFA}" type="datetimeFigureOut">
               <a:rPr lang="de-DE" smtClean="0"/>
-              <a:t>07.01.25</a:t>
+              <a:t>05.02.2025</a:t>
             </a:fld>
             <a:endParaRPr lang="de-DE"/>
           </a:p>
@@ -1240,7 +1242,7 @@
           <a:p>
             <a:fld id="{D504FEAC-1E62-0E47-82AE-5BB4BD139FFA}" type="datetimeFigureOut">
               <a:rPr lang="de-DE" smtClean="0"/>
-              <a:t>07.01.25</a:t>
+              <a:t>05.02.2025</a:t>
             </a:fld>
             <a:endParaRPr lang="de-DE"/>
           </a:p>
@@ -1438,7 +1440,7 @@
           <a:p>
             <a:fld id="{D504FEAC-1E62-0E47-82AE-5BB4BD139FFA}" type="datetimeFigureOut">
               <a:rPr lang="de-DE" smtClean="0"/>
-              <a:t>07.01.25</a:t>
+              <a:t>05.02.2025</a:t>
             </a:fld>
             <a:endParaRPr lang="de-DE"/>
           </a:p>
@@ -1713,7 +1715,7 @@
           <a:p>
             <a:fld id="{D504FEAC-1E62-0E47-82AE-5BB4BD139FFA}" type="datetimeFigureOut">
               <a:rPr lang="de-DE" smtClean="0"/>
-              <a:t>07.01.25</a:t>
+              <a:t>05.02.2025</a:t>
             </a:fld>
             <a:endParaRPr lang="de-DE"/>
           </a:p>
@@ -1978,7 +1980,7 @@
           <a:p>
             <a:fld id="{D504FEAC-1E62-0E47-82AE-5BB4BD139FFA}" type="datetimeFigureOut">
               <a:rPr lang="de-DE" smtClean="0"/>
-              <a:t>07.01.25</a:t>
+              <a:t>05.02.2025</a:t>
             </a:fld>
             <a:endParaRPr lang="de-DE"/>
           </a:p>
@@ -2390,7 +2392,7 @@
           <a:p>
             <a:fld id="{D504FEAC-1E62-0E47-82AE-5BB4BD139FFA}" type="datetimeFigureOut">
               <a:rPr lang="de-DE" smtClean="0"/>
-              <a:t>07.01.25</a:t>
+              <a:t>05.02.2025</a:t>
             </a:fld>
             <a:endParaRPr lang="de-DE"/>
           </a:p>
@@ -2531,7 +2533,7 @@
           <a:p>
             <a:fld id="{D504FEAC-1E62-0E47-82AE-5BB4BD139FFA}" type="datetimeFigureOut">
               <a:rPr lang="de-DE" smtClean="0"/>
-              <a:t>07.01.25</a:t>
+              <a:t>05.02.2025</a:t>
             </a:fld>
             <a:endParaRPr lang="de-DE"/>
           </a:p>
@@ -2644,7 +2646,7 @@
           <a:p>
             <a:fld id="{D504FEAC-1E62-0E47-82AE-5BB4BD139FFA}" type="datetimeFigureOut">
               <a:rPr lang="de-DE" smtClean="0"/>
-              <a:t>07.01.25</a:t>
+              <a:t>05.02.2025</a:t>
             </a:fld>
             <a:endParaRPr lang="de-DE"/>
           </a:p>
@@ -2955,7 +2957,7 @@
           <a:p>
             <a:fld id="{D504FEAC-1E62-0E47-82AE-5BB4BD139FFA}" type="datetimeFigureOut">
               <a:rPr lang="de-DE" smtClean="0"/>
-              <a:t>07.01.25</a:t>
+              <a:t>05.02.2025</a:t>
             </a:fld>
             <a:endParaRPr lang="de-DE"/>
           </a:p>
@@ -3243,7 +3245,7 @@
           <a:p>
             <a:fld id="{D504FEAC-1E62-0E47-82AE-5BB4BD139FFA}" type="datetimeFigureOut">
               <a:rPr lang="de-DE" smtClean="0"/>
-              <a:t>07.01.25</a:t>
+              <a:t>05.02.2025</a:t>
             </a:fld>
             <a:endParaRPr lang="de-DE"/>
           </a:p>
@@ -3484,7 +3486,7 @@
           <a:p>
             <a:fld id="{D504FEAC-1E62-0E47-82AE-5BB4BD139FFA}" type="datetimeFigureOut">
               <a:rPr lang="de-DE" smtClean="0"/>
-              <a:t>07.01.25</a:t>
+              <a:t>05.02.2025</a:t>
             </a:fld>
             <a:endParaRPr lang="de-DE"/>
           </a:p>
@@ -16652,6 +16654,1278 @@
           <p:cNvPr id="2" name="Titel 1">
             <a:extLst>
               <a:ext uri="{FF2B5EF4-FFF2-40B4-BE49-F238E27FC236}">
+                <a16:creationId xmlns:a16="http://schemas.microsoft.com/office/drawing/2014/main" id="{B2CE2216-36A2-9A26-17AC-983003F8A9A0}"/>
+              </a:ext>
+            </a:extLst>
+          </p:cNvPr>
+          <p:cNvSpPr>
+            <a:spLocks noGrp="1"/>
+          </p:cNvSpPr>
+          <p:nvPr>
+            <p:ph type="title"/>
+          </p:nvPr>
+        </p:nvSpPr>
+        <p:spPr/>
+        <p:txBody>
+          <a:bodyPr/>
+          <a:lstStyle/>
+          <a:p>
+            <a:r>
+              <a:rPr lang="de-DE" dirty="0" err="1"/>
+              <a:t>Step</a:t>
+            </a:r>
+            <a:r>
+              <a:rPr lang="de-DE" dirty="0"/>
+              <a:t> 140</a:t>
+            </a:r>
+          </a:p>
+        </p:txBody>
+      </p:sp>
+      <p:sp>
+        <p:nvSpPr>
+          <p:cNvPr id="3" name="Inhaltsplatzhalter 2">
+            <a:extLst>
+              <a:ext uri="{FF2B5EF4-FFF2-40B4-BE49-F238E27FC236}">
+                <a16:creationId xmlns:a16="http://schemas.microsoft.com/office/drawing/2014/main" id="{3E4C7455-7D7E-52D9-5553-9334384413D5}"/>
+              </a:ext>
+            </a:extLst>
+          </p:cNvPr>
+          <p:cNvSpPr>
+            <a:spLocks noGrp="1"/>
+          </p:cNvSpPr>
+          <p:nvPr>
+            <p:ph idx="1"/>
+          </p:nvPr>
+        </p:nvSpPr>
+        <p:spPr/>
+        <p:txBody>
+          <a:bodyPr>
+            <a:normAutofit lnSpcReduction="10000"/>
+          </a:bodyPr>
+          <a:lstStyle/>
+          <a:p>
+            <a:r>
+              <a:rPr lang="de-DE" dirty="0"/>
+              <a:t>Thema: Messaging</a:t>
+            </a:r>
+          </a:p>
+          <a:p>
+            <a:pPr lvl="1"/>
+            <a:r>
+              <a:rPr lang="de-DE" dirty="0"/>
+              <a:t>Producer sendet Messages</a:t>
+            </a:r>
+          </a:p>
+          <a:p>
+            <a:pPr lvl="1"/>
+            <a:r>
+              <a:rPr lang="de-DE" dirty="0"/>
+              <a:t>Consumer empfängt Messages</a:t>
+            </a:r>
+          </a:p>
+          <a:p>
+            <a:pPr lvl="1"/>
+            <a:r>
+              <a:rPr lang="de-DE" dirty="0"/>
+              <a:t>Zusätzliche Infrastruktur: Message-Broker</a:t>
+            </a:r>
+          </a:p>
+          <a:p>
+            <a:pPr lvl="1"/>
+            <a:r>
+              <a:rPr lang="de-DE" dirty="0"/>
+              <a:t>Verschiedene Arten von Messages:</a:t>
+            </a:r>
+          </a:p>
+          <a:p>
+            <a:pPr lvl="2"/>
+            <a:r>
+              <a:rPr lang="de-DE" dirty="0" err="1"/>
+              <a:t>point</a:t>
+            </a:r>
+            <a:r>
+              <a:rPr lang="de-DE" dirty="0"/>
+              <a:t>-</a:t>
+            </a:r>
+            <a:r>
+              <a:rPr lang="de-DE" dirty="0" err="1"/>
+              <a:t>to</a:t>
+            </a:r>
+            <a:r>
+              <a:rPr lang="de-DE" dirty="0"/>
+              <a:t>-point </a:t>
+            </a:r>
+          </a:p>
+          <a:p>
+            <a:pPr lvl="3"/>
+            <a:r>
+              <a:rPr lang="de-DE" dirty="0"/>
+              <a:t>Message wird nur von einem Consumer verarbeitet</a:t>
+            </a:r>
+          </a:p>
+          <a:p>
+            <a:pPr lvl="3"/>
+            <a:r>
+              <a:rPr lang="de-DE" dirty="0"/>
+              <a:t>Messages werden vorgehalten, bis sie abgeholt wurden</a:t>
+            </a:r>
+          </a:p>
+          <a:p>
+            <a:pPr lvl="2"/>
+            <a:r>
+              <a:rPr lang="de-DE" dirty="0"/>
+              <a:t>publish/</a:t>
+            </a:r>
+            <a:r>
+              <a:rPr lang="de-DE" dirty="0" err="1"/>
+              <a:t>subscribe</a:t>
+            </a:r>
+            <a:endParaRPr lang="de-DE" dirty="0"/>
+          </a:p>
+          <a:p>
+            <a:pPr lvl="3"/>
+            <a:r>
+              <a:rPr lang="de-DE" dirty="0"/>
+              <a:t>Messages können an mehrere Consumer ausgeliefert werden</a:t>
+            </a:r>
+          </a:p>
+          <a:p>
+            <a:pPr lvl="3"/>
+            <a:r>
+              <a:rPr lang="de-DE" dirty="0"/>
+              <a:t>Messages gehen verloren, wenn Consumer nicht </a:t>
+            </a:r>
+            <a:r>
+              <a:rPr lang="de-DE" dirty="0" err="1"/>
+              <a:t>subscribed</a:t>
+            </a:r>
+            <a:r>
+              <a:rPr lang="de-DE" dirty="0"/>
+              <a:t> ist</a:t>
+            </a:r>
+          </a:p>
+          <a:p>
+            <a:pPr lvl="1"/>
+            <a:r>
+              <a:rPr lang="de-DE" dirty="0"/>
+              <a:t>Können je nach Broker/Protokoll transaktional abgesichert werden</a:t>
+            </a:r>
+          </a:p>
+        </p:txBody>
+      </p:sp>
+    </p:spTree>
+    <p:extLst>
+      <p:ext uri="{BB962C8B-B14F-4D97-AF65-F5344CB8AC3E}">
+        <p14:creationId xmlns:p14="http://schemas.microsoft.com/office/powerpoint/2010/main" val="1635641626"/>
+      </p:ext>
+    </p:extLst>
+  </p:cSld>
+  <p:clrMapOvr>
+    <a:masterClrMapping/>
+  </p:clrMapOvr>
+</p:sld>
+</file>
+
+<file path=ppt/slides/slide54.xml><?xml version="1.0" encoding="utf-8"?>
+<p:sld xmlns:a="http://schemas.openxmlformats.org/drawingml/2006/main" xmlns:r="http://schemas.openxmlformats.org/officeDocument/2006/relationships" xmlns:p="http://schemas.openxmlformats.org/presentationml/2006/main">
+  <p:cSld>
+    <p:spTree>
+      <p:nvGrpSpPr>
+        <p:cNvPr id="1" name=""/>
+        <p:cNvGrpSpPr/>
+        <p:nvPr/>
+      </p:nvGrpSpPr>
+      <p:grpSpPr>
+        <a:xfrm>
+          <a:off x="0" y="0"/>
+          <a:ext cx="0" cy="0"/>
+          <a:chOff x="0" y="0"/>
+          <a:chExt cx="0" cy="0"/>
+        </a:xfrm>
+      </p:grpSpPr>
+      <p:sp>
+        <p:nvSpPr>
+          <p:cNvPr id="2" name="Titel 1">
+            <a:extLst>
+              <a:ext uri="{FF2B5EF4-FFF2-40B4-BE49-F238E27FC236}">
+                <a16:creationId xmlns:a16="http://schemas.microsoft.com/office/drawing/2014/main" id="{8256F45D-D489-76EE-621E-75561CC0F072}"/>
+              </a:ext>
+            </a:extLst>
+          </p:cNvPr>
+          <p:cNvSpPr>
+            <a:spLocks noGrp="1"/>
+          </p:cNvSpPr>
+          <p:nvPr>
+            <p:ph type="title"/>
+          </p:nvPr>
+        </p:nvSpPr>
+        <p:spPr/>
+        <p:txBody>
+          <a:bodyPr/>
+          <a:lstStyle/>
+          <a:p>
+            <a:r>
+              <a:rPr lang="de-DE" dirty="0" err="1"/>
+              <a:t>Step</a:t>
+            </a:r>
+            <a:r>
+              <a:rPr lang="de-DE" dirty="0"/>
+              <a:t> 140</a:t>
+            </a:r>
+          </a:p>
+        </p:txBody>
+      </p:sp>
+      <p:sp>
+        <p:nvSpPr>
+          <p:cNvPr id="6" name="Rechteck: abgerundete Ecken 5">
+            <a:extLst>
+              <a:ext uri="{FF2B5EF4-FFF2-40B4-BE49-F238E27FC236}">
+                <a16:creationId xmlns:a16="http://schemas.microsoft.com/office/drawing/2014/main" id="{0F7FB2C5-765E-58D8-F536-F107FB97AFB1}"/>
+              </a:ext>
+            </a:extLst>
+          </p:cNvPr>
+          <p:cNvSpPr/>
+          <p:nvPr/>
+        </p:nvSpPr>
+        <p:spPr>
+          <a:xfrm>
+            <a:off x="1511300" y="1836808"/>
+            <a:ext cx="2057400" cy="575917"/>
+          </a:xfrm>
+          <a:prstGeom prst="roundRect">
+            <a:avLst/>
+          </a:prstGeom>
+        </p:spPr>
+        <p:style>
+          <a:lnRef idx="2">
+            <a:schemeClr val="accent1">
+              <a:shade val="15000"/>
+            </a:schemeClr>
+          </a:lnRef>
+          <a:fillRef idx="1">
+            <a:schemeClr val="accent1"/>
+          </a:fillRef>
+          <a:effectRef idx="0">
+            <a:schemeClr val="accent1"/>
+          </a:effectRef>
+          <a:fontRef idx="minor">
+            <a:schemeClr val="lt1"/>
+          </a:fontRef>
+        </p:style>
+        <p:txBody>
+          <a:bodyPr rtlCol="0" anchor="ctr"/>
+          <a:lstStyle/>
+          <a:p>
+            <a:pPr algn="ctr"/>
+            <a:r>
+              <a:rPr lang="de-DE" dirty="0"/>
+              <a:t>Producer 1</a:t>
+            </a:r>
+          </a:p>
+        </p:txBody>
+      </p:sp>
+      <p:sp>
+        <p:nvSpPr>
+          <p:cNvPr id="7" name="Rechteck: abgerundete Ecken 6">
+            <a:extLst>
+              <a:ext uri="{FF2B5EF4-FFF2-40B4-BE49-F238E27FC236}">
+                <a16:creationId xmlns:a16="http://schemas.microsoft.com/office/drawing/2014/main" id="{42058839-0599-69B6-4ED4-C0D76A74C9BE}"/>
+              </a:ext>
+            </a:extLst>
+          </p:cNvPr>
+          <p:cNvSpPr/>
+          <p:nvPr/>
+        </p:nvSpPr>
+        <p:spPr>
+          <a:xfrm>
+            <a:off x="1511300" y="4234346"/>
+            <a:ext cx="2057400" cy="575917"/>
+          </a:xfrm>
+          <a:prstGeom prst="roundRect">
+            <a:avLst/>
+          </a:prstGeom>
+        </p:spPr>
+        <p:style>
+          <a:lnRef idx="2">
+            <a:schemeClr val="accent1">
+              <a:shade val="15000"/>
+            </a:schemeClr>
+          </a:lnRef>
+          <a:fillRef idx="1">
+            <a:schemeClr val="accent1"/>
+          </a:fillRef>
+          <a:effectRef idx="0">
+            <a:schemeClr val="accent1"/>
+          </a:effectRef>
+          <a:fontRef idx="minor">
+            <a:schemeClr val="lt1"/>
+          </a:fontRef>
+        </p:style>
+        <p:txBody>
+          <a:bodyPr rtlCol="0" anchor="ctr"/>
+          <a:lstStyle/>
+          <a:p>
+            <a:pPr algn="ctr"/>
+            <a:r>
+              <a:rPr lang="de-DE" dirty="0"/>
+              <a:t>Producer 3</a:t>
+            </a:r>
+          </a:p>
+        </p:txBody>
+      </p:sp>
+      <p:sp>
+        <p:nvSpPr>
+          <p:cNvPr id="8" name="Rechteck: abgerundete Ecken 7">
+            <a:extLst>
+              <a:ext uri="{FF2B5EF4-FFF2-40B4-BE49-F238E27FC236}">
+                <a16:creationId xmlns:a16="http://schemas.microsoft.com/office/drawing/2014/main" id="{5DB11FFC-B3D7-833B-34DC-D57A97D879DA}"/>
+              </a:ext>
+            </a:extLst>
+          </p:cNvPr>
+          <p:cNvSpPr/>
+          <p:nvPr/>
+        </p:nvSpPr>
+        <p:spPr>
+          <a:xfrm>
+            <a:off x="1511300" y="3035577"/>
+            <a:ext cx="2057400" cy="575917"/>
+          </a:xfrm>
+          <a:prstGeom prst="roundRect">
+            <a:avLst/>
+          </a:prstGeom>
+        </p:spPr>
+        <p:style>
+          <a:lnRef idx="2">
+            <a:schemeClr val="accent1">
+              <a:shade val="15000"/>
+            </a:schemeClr>
+          </a:lnRef>
+          <a:fillRef idx="1">
+            <a:schemeClr val="accent1"/>
+          </a:fillRef>
+          <a:effectRef idx="0">
+            <a:schemeClr val="accent1"/>
+          </a:effectRef>
+          <a:fontRef idx="minor">
+            <a:schemeClr val="lt1"/>
+          </a:fontRef>
+        </p:style>
+        <p:txBody>
+          <a:bodyPr rtlCol="0" anchor="ctr"/>
+          <a:lstStyle/>
+          <a:p>
+            <a:pPr algn="ctr"/>
+            <a:r>
+              <a:rPr lang="de-DE" dirty="0"/>
+              <a:t>Producer 2</a:t>
+            </a:r>
+          </a:p>
+        </p:txBody>
+      </p:sp>
+      <p:sp>
+        <p:nvSpPr>
+          <p:cNvPr id="9" name="Rechteck 8">
+            <a:extLst>
+              <a:ext uri="{FF2B5EF4-FFF2-40B4-BE49-F238E27FC236}">
+                <a16:creationId xmlns:a16="http://schemas.microsoft.com/office/drawing/2014/main" id="{D523FAE7-5B82-ECD6-9856-89F9343F4A2F}"/>
+              </a:ext>
+            </a:extLst>
+          </p:cNvPr>
+          <p:cNvSpPr/>
+          <p:nvPr/>
+        </p:nvSpPr>
+        <p:spPr>
+          <a:xfrm>
+            <a:off x="4386470" y="1690688"/>
+            <a:ext cx="3001617" cy="4418564"/>
+          </a:xfrm>
+          <a:prstGeom prst="rect">
+            <a:avLst/>
+          </a:prstGeom>
+        </p:spPr>
+        <p:style>
+          <a:lnRef idx="1">
+            <a:schemeClr val="accent4"/>
+          </a:lnRef>
+          <a:fillRef idx="2">
+            <a:schemeClr val="accent4"/>
+          </a:fillRef>
+          <a:effectRef idx="1">
+            <a:schemeClr val="accent4"/>
+          </a:effectRef>
+          <a:fontRef idx="minor">
+            <a:schemeClr val="dk1"/>
+          </a:fontRef>
+        </p:style>
+        <p:txBody>
+          <a:bodyPr rtlCol="0" anchor="ctr"/>
+          <a:lstStyle/>
+          <a:p>
+            <a:pPr algn="ctr"/>
+            <a:endParaRPr lang="de-DE" dirty="0"/>
+          </a:p>
+        </p:txBody>
+      </p:sp>
+      <p:sp>
+        <p:nvSpPr>
+          <p:cNvPr id="10" name="Flussdiagramm: Datenträger mit direktem Zugriff 9">
+            <a:extLst>
+              <a:ext uri="{FF2B5EF4-FFF2-40B4-BE49-F238E27FC236}">
+                <a16:creationId xmlns:a16="http://schemas.microsoft.com/office/drawing/2014/main" id="{4F1B6C39-AE00-0903-0855-BAA56B9594FB}"/>
+              </a:ext>
+            </a:extLst>
+          </p:cNvPr>
+          <p:cNvSpPr/>
+          <p:nvPr/>
+        </p:nvSpPr>
+        <p:spPr>
+          <a:xfrm>
+            <a:off x="4956313" y="2412725"/>
+            <a:ext cx="1994452" cy="622852"/>
+          </a:xfrm>
+          <a:prstGeom prst="flowChartMagneticDrum">
+            <a:avLst/>
+          </a:prstGeom>
+        </p:spPr>
+        <p:style>
+          <a:lnRef idx="2">
+            <a:schemeClr val="accent4">
+              <a:shade val="15000"/>
+            </a:schemeClr>
+          </a:lnRef>
+          <a:fillRef idx="1">
+            <a:schemeClr val="accent4"/>
+          </a:fillRef>
+          <a:effectRef idx="0">
+            <a:schemeClr val="accent4"/>
+          </a:effectRef>
+          <a:fontRef idx="minor">
+            <a:schemeClr val="lt1"/>
+          </a:fontRef>
+        </p:style>
+        <p:txBody>
+          <a:bodyPr rtlCol="0" anchor="ctr"/>
+          <a:lstStyle/>
+          <a:p>
+            <a:pPr algn="ctr"/>
+            <a:endParaRPr lang="de-DE"/>
+          </a:p>
+        </p:txBody>
+      </p:sp>
+      <p:sp>
+        <p:nvSpPr>
+          <p:cNvPr id="11" name="Flussdiagramm: Datenträger mit direktem Zugriff 10">
+            <a:extLst>
+              <a:ext uri="{FF2B5EF4-FFF2-40B4-BE49-F238E27FC236}">
+                <a16:creationId xmlns:a16="http://schemas.microsoft.com/office/drawing/2014/main" id="{A12FC5AA-C2FA-BE32-BECD-FA08A11B54E0}"/>
+              </a:ext>
+            </a:extLst>
+          </p:cNvPr>
+          <p:cNvSpPr/>
+          <p:nvPr/>
+        </p:nvSpPr>
+        <p:spPr>
+          <a:xfrm>
+            <a:off x="4956313" y="3611494"/>
+            <a:ext cx="1994452" cy="622852"/>
+          </a:xfrm>
+          <a:prstGeom prst="flowChartMagneticDrum">
+            <a:avLst/>
+          </a:prstGeom>
+        </p:spPr>
+        <p:style>
+          <a:lnRef idx="2">
+            <a:schemeClr val="accent4">
+              <a:shade val="15000"/>
+            </a:schemeClr>
+          </a:lnRef>
+          <a:fillRef idx="1">
+            <a:schemeClr val="accent4"/>
+          </a:fillRef>
+          <a:effectRef idx="0">
+            <a:schemeClr val="accent4"/>
+          </a:effectRef>
+          <a:fontRef idx="minor">
+            <a:schemeClr val="lt1"/>
+          </a:fontRef>
+        </p:style>
+        <p:txBody>
+          <a:bodyPr rtlCol="0" anchor="ctr"/>
+          <a:lstStyle/>
+          <a:p>
+            <a:pPr algn="ctr"/>
+            <a:endParaRPr lang="de-DE"/>
+          </a:p>
+        </p:txBody>
+      </p:sp>
+      <p:cxnSp>
+        <p:nvCxnSpPr>
+          <p:cNvPr id="13" name="Gerade Verbindung mit Pfeil 12">
+            <a:extLst>
+              <a:ext uri="{FF2B5EF4-FFF2-40B4-BE49-F238E27FC236}">
+                <a16:creationId xmlns:a16="http://schemas.microsoft.com/office/drawing/2014/main" id="{989F96F8-A228-D003-54D8-D38294AF187C}"/>
+              </a:ext>
+            </a:extLst>
+          </p:cNvPr>
+          <p:cNvCxnSpPr>
+            <a:stCxn id="6" idx="3"/>
+            <a:endCxn id="10" idx="1"/>
+          </p:cNvCxnSpPr>
+          <p:nvPr/>
+        </p:nvCxnSpPr>
+        <p:spPr>
+          <a:xfrm>
+            <a:off x="3568700" y="2124767"/>
+            <a:ext cx="1387613" cy="599384"/>
+          </a:xfrm>
+          <a:prstGeom prst="straightConnector1">
+            <a:avLst/>
+          </a:prstGeom>
+          <a:ln>
+            <a:tailEnd type="triangle"/>
+          </a:ln>
+        </p:spPr>
+        <p:style>
+          <a:lnRef idx="1">
+            <a:schemeClr val="accent1"/>
+          </a:lnRef>
+          <a:fillRef idx="0">
+            <a:schemeClr val="accent1"/>
+          </a:fillRef>
+          <a:effectRef idx="0">
+            <a:schemeClr val="accent1"/>
+          </a:effectRef>
+          <a:fontRef idx="minor">
+            <a:schemeClr val="tx1"/>
+          </a:fontRef>
+        </p:style>
+      </p:cxnSp>
+      <p:cxnSp>
+        <p:nvCxnSpPr>
+          <p:cNvPr id="15" name="Gerade Verbindung mit Pfeil 14">
+            <a:extLst>
+              <a:ext uri="{FF2B5EF4-FFF2-40B4-BE49-F238E27FC236}">
+                <a16:creationId xmlns:a16="http://schemas.microsoft.com/office/drawing/2014/main" id="{FAFEAAAE-D4A6-7CD8-F024-DE7A2E548C55}"/>
+              </a:ext>
+            </a:extLst>
+          </p:cNvPr>
+          <p:cNvCxnSpPr>
+            <a:stCxn id="8" idx="3"/>
+          </p:cNvCxnSpPr>
+          <p:nvPr/>
+        </p:nvCxnSpPr>
+        <p:spPr>
+          <a:xfrm>
+            <a:off x="3568700" y="3323536"/>
+            <a:ext cx="1387613" cy="613189"/>
+          </a:xfrm>
+          <a:prstGeom prst="straightConnector1">
+            <a:avLst/>
+          </a:prstGeom>
+          <a:ln>
+            <a:tailEnd type="triangle"/>
+          </a:ln>
+        </p:spPr>
+        <p:style>
+          <a:lnRef idx="1">
+            <a:schemeClr val="accent1"/>
+          </a:lnRef>
+          <a:fillRef idx="0">
+            <a:schemeClr val="accent1"/>
+          </a:fillRef>
+          <a:effectRef idx="0">
+            <a:schemeClr val="accent1"/>
+          </a:effectRef>
+          <a:fontRef idx="minor">
+            <a:schemeClr val="tx1"/>
+          </a:fontRef>
+        </p:style>
+      </p:cxnSp>
+      <p:cxnSp>
+        <p:nvCxnSpPr>
+          <p:cNvPr id="17" name="Gerade Verbindung mit Pfeil 16">
+            <a:extLst>
+              <a:ext uri="{FF2B5EF4-FFF2-40B4-BE49-F238E27FC236}">
+                <a16:creationId xmlns:a16="http://schemas.microsoft.com/office/drawing/2014/main" id="{FD9740CB-3D35-6B66-C2B7-D8CAB56B192B}"/>
+              </a:ext>
+            </a:extLst>
+          </p:cNvPr>
+          <p:cNvCxnSpPr>
+            <a:stCxn id="7" idx="3"/>
+            <a:endCxn id="11" idx="1"/>
+          </p:cNvCxnSpPr>
+          <p:nvPr/>
+        </p:nvCxnSpPr>
+        <p:spPr>
+          <a:xfrm flipV="1">
+            <a:off x="3568700" y="3922920"/>
+            <a:ext cx="1387613" cy="599385"/>
+          </a:xfrm>
+          <a:prstGeom prst="straightConnector1">
+            <a:avLst/>
+          </a:prstGeom>
+          <a:ln>
+            <a:tailEnd type="triangle"/>
+          </a:ln>
+        </p:spPr>
+        <p:style>
+          <a:lnRef idx="1">
+            <a:schemeClr val="accent1"/>
+          </a:lnRef>
+          <a:fillRef idx="0">
+            <a:schemeClr val="accent1"/>
+          </a:fillRef>
+          <a:effectRef idx="0">
+            <a:schemeClr val="accent1"/>
+          </a:effectRef>
+          <a:fontRef idx="minor">
+            <a:schemeClr val="tx1"/>
+          </a:fontRef>
+        </p:style>
+      </p:cxnSp>
+      <p:sp>
+        <p:nvSpPr>
+          <p:cNvPr id="18" name="Rechteck: abgerundete Ecken 17">
+            <a:extLst>
+              <a:ext uri="{FF2B5EF4-FFF2-40B4-BE49-F238E27FC236}">
+                <a16:creationId xmlns:a16="http://schemas.microsoft.com/office/drawing/2014/main" id="{F83CC7BB-E131-E056-BC75-6624A03DA640}"/>
+              </a:ext>
+            </a:extLst>
+          </p:cNvPr>
+          <p:cNvSpPr/>
+          <p:nvPr/>
+        </p:nvSpPr>
+        <p:spPr>
+          <a:xfrm>
+            <a:off x="8342243" y="1835359"/>
+            <a:ext cx="2057400" cy="575917"/>
+          </a:xfrm>
+          <a:prstGeom prst="roundRect">
+            <a:avLst/>
+          </a:prstGeom>
+        </p:spPr>
+        <p:style>
+          <a:lnRef idx="2">
+            <a:schemeClr val="accent6">
+              <a:shade val="15000"/>
+            </a:schemeClr>
+          </a:lnRef>
+          <a:fillRef idx="1">
+            <a:schemeClr val="accent6"/>
+          </a:fillRef>
+          <a:effectRef idx="0">
+            <a:schemeClr val="accent6"/>
+          </a:effectRef>
+          <a:fontRef idx="minor">
+            <a:schemeClr val="lt1"/>
+          </a:fontRef>
+        </p:style>
+        <p:txBody>
+          <a:bodyPr rtlCol="0" anchor="ctr"/>
+          <a:lstStyle/>
+          <a:p>
+            <a:pPr algn="ctr"/>
+            <a:r>
+              <a:rPr lang="de-DE" dirty="0"/>
+              <a:t>Consumer 1</a:t>
+            </a:r>
+          </a:p>
+        </p:txBody>
+      </p:sp>
+      <p:sp>
+        <p:nvSpPr>
+          <p:cNvPr id="19" name="Rechteck: abgerundete Ecken 18">
+            <a:extLst>
+              <a:ext uri="{FF2B5EF4-FFF2-40B4-BE49-F238E27FC236}">
+                <a16:creationId xmlns:a16="http://schemas.microsoft.com/office/drawing/2014/main" id="{6B95D873-11C9-63A8-F254-DF8E2300FC19}"/>
+              </a:ext>
+            </a:extLst>
+          </p:cNvPr>
+          <p:cNvSpPr/>
+          <p:nvPr/>
+        </p:nvSpPr>
+        <p:spPr>
+          <a:xfrm>
+            <a:off x="8342243" y="2992439"/>
+            <a:ext cx="2057400" cy="575917"/>
+          </a:xfrm>
+          <a:prstGeom prst="roundRect">
+            <a:avLst/>
+          </a:prstGeom>
+        </p:spPr>
+        <p:style>
+          <a:lnRef idx="2">
+            <a:schemeClr val="accent6">
+              <a:shade val="15000"/>
+            </a:schemeClr>
+          </a:lnRef>
+          <a:fillRef idx="1">
+            <a:schemeClr val="accent6"/>
+          </a:fillRef>
+          <a:effectRef idx="0">
+            <a:schemeClr val="accent6"/>
+          </a:effectRef>
+          <a:fontRef idx="minor">
+            <a:schemeClr val="lt1"/>
+          </a:fontRef>
+        </p:style>
+        <p:txBody>
+          <a:bodyPr rtlCol="0" anchor="ctr"/>
+          <a:lstStyle/>
+          <a:p>
+            <a:pPr algn="ctr"/>
+            <a:r>
+              <a:rPr lang="de-DE" dirty="0"/>
+              <a:t>Consumer 2</a:t>
+            </a:r>
+          </a:p>
+        </p:txBody>
+      </p:sp>
+      <p:sp>
+        <p:nvSpPr>
+          <p:cNvPr id="20" name="Rechteck: abgerundete Ecken 19">
+            <a:extLst>
+              <a:ext uri="{FF2B5EF4-FFF2-40B4-BE49-F238E27FC236}">
+                <a16:creationId xmlns:a16="http://schemas.microsoft.com/office/drawing/2014/main" id="{0145D4C3-74FD-A9AA-9F39-0CFC57F8D99D}"/>
+              </a:ext>
+            </a:extLst>
+          </p:cNvPr>
+          <p:cNvSpPr/>
+          <p:nvPr/>
+        </p:nvSpPr>
+        <p:spPr>
+          <a:xfrm>
+            <a:off x="8342243" y="4236829"/>
+            <a:ext cx="2057400" cy="575917"/>
+          </a:xfrm>
+          <a:prstGeom prst="roundRect">
+            <a:avLst/>
+          </a:prstGeom>
+        </p:spPr>
+        <p:style>
+          <a:lnRef idx="2">
+            <a:schemeClr val="accent6">
+              <a:shade val="15000"/>
+            </a:schemeClr>
+          </a:lnRef>
+          <a:fillRef idx="1">
+            <a:schemeClr val="accent6"/>
+          </a:fillRef>
+          <a:effectRef idx="0">
+            <a:schemeClr val="accent6"/>
+          </a:effectRef>
+          <a:fontRef idx="minor">
+            <a:schemeClr val="lt1"/>
+          </a:fontRef>
+        </p:style>
+        <p:txBody>
+          <a:bodyPr rtlCol="0" anchor="ctr"/>
+          <a:lstStyle/>
+          <a:p>
+            <a:pPr algn="ctr"/>
+            <a:r>
+              <a:rPr lang="de-DE" dirty="0"/>
+              <a:t>Consumer 3</a:t>
+            </a:r>
+          </a:p>
+        </p:txBody>
+      </p:sp>
+      <p:cxnSp>
+        <p:nvCxnSpPr>
+          <p:cNvPr id="22" name="Gerade Verbindung mit Pfeil 21">
+            <a:extLst>
+              <a:ext uri="{FF2B5EF4-FFF2-40B4-BE49-F238E27FC236}">
+                <a16:creationId xmlns:a16="http://schemas.microsoft.com/office/drawing/2014/main" id="{5E2A865C-0368-9B36-7FF2-8963750C93CB}"/>
+              </a:ext>
+            </a:extLst>
+          </p:cNvPr>
+          <p:cNvCxnSpPr>
+            <a:endCxn id="18" idx="1"/>
+          </p:cNvCxnSpPr>
+          <p:nvPr/>
+        </p:nvCxnSpPr>
+        <p:spPr>
+          <a:xfrm flipV="1">
+            <a:off x="6950765" y="2123318"/>
+            <a:ext cx="1391478" cy="600833"/>
+          </a:xfrm>
+          <a:prstGeom prst="straightConnector1">
+            <a:avLst/>
+          </a:prstGeom>
+          <a:ln>
+            <a:tailEnd type="triangle"/>
+          </a:ln>
+        </p:spPr>
+        <p:style>
+          <a:lnRef idx="1">
+            <a:schemeClr val="accent1"/>
+          </a:lnRef>
+          <a:fillRef idx="0">
+            <a:schemeClr val="accent1"/>
+          </a:fillRef>
+          <a:effectRef idx="0">
+            <a:schemeClr val="accent1"/>
+          </a:effectRef>
+          <a:fontRef idx="minor">
+            <a:schemeClr val="tx1"/>
+          </a:fontRef>
+        </p:style>
+      </p:cxnSp>
+      <p:cxnSp>
+        <p:nvCxnSpPr>
+          <p:cNvPr id="24" name="Gerade Verbindung mit Pfeil 23">
+            <a:extLst>
+              <a:ext uri="{FF2B5EF4-FFF2-40B4-BE49-F238E27FC236}">
+                <a16:creationId xmlns:a16="http://schemas.microsoft.com/office/drawing/2014/main" id="{71A55687-EB92-1B7D-7B84-EB4C7FA10628}"/>
+              </a:ext>
+            </a:extLst>
+          </p:cNvPr>
+          <p:cNvCxnSpPr>
+            <a:stCxn id="10" idx="4"/>
+            <a:endCxn id="19" idx="1"/>
+          </p:cNvCxnSpPr>
+          <p:nvPr/>
+        </p:nvCxnSpPr>
+        <p:spPr>
+          <a:xfrm>
+            <a:off x="6950765" y="2724151"/>
+            <a:ext cx="1391478" cy="556247"/>
+          </a:xfrm>
+          <a:prstGeom prst="straightConnector1">
+            <a:avLst/>
+          </a:prstGeom>
+          <a:ln>
+            <a:tailEnd type="triangle"/>
+          </a:ln>
+        </p:spPr>
+        <p:style>
+          <a:lnRef idx="1">
+            <a:schemeClr val="accent1"/>
+          </a:lnRef>
+          <a:fillRef idx="0">
+            <a:schemeClr val="accent1"/>
+          </a:fillRef>
+          <a:effectRef idx="0">
+            <a:schemeClr val="accent1"/>
+          </a:effectRef>
+          <a:fontRef idx="minor">
+            <a:schemeClr val="tx1"/>
+          </a:fontRef>
+        </p:style>
+      </p:cxnSp>
+      <p:cxnSp>
+        <p:nvCxnSpPr>
+          <p:cNvPr id="26" name="Gerade Verbindung mit Pfeil 25">
+            <a:extLst>
+              <a:ext uri="{FF2B5EF4-FFF2-40B4-BE49-F238E27FC236}">
+                <a16:creationId xmlns:a16="http://schemas.microsoft.com/office/drawing/2014/main" id="{EC80FFB1-E4CF-6854-8CAF-02EB67F81969}"/>
+              </a:ext>
+            </a:extLst>
+          </p:cNvPr>
+          <p:cNvCxnSpPr>
+            <a:cxnSpLocks/>
+            <a:stCxn id="11" idx="4"/>
+            <a:endCxn id="20" idx="1"/>
+          </p:cNvCxnSpPr>
+          <p:nvPr/>
+        </p:nvCxnSpPr>
+        <p:spPr>
+          <a:xfrm>
+            <a:off x="6950765" y="3922920"/>
+            <a:ext cx="1391478" cy="601868"/>
+          </a:xfrm>
+          <a:prstGeom prst="straightConnector1">
+            <a:avLst/>
+          </a:prstGeom>
+          <a:ln>
+            <a:tailEnd type="triangle"/>
+          </a:ln>
+        </p:spPr>
+        <p:style>
+          <a:lnRef idx="1">
+            <a:schemeClr val="accent1"/>
+          </a:lnRef>
+          <a:fillRef idx="0">
+            <a:schemeClr val="accent1"/>
+          </a:fillRef>
+          <a:effectRef idx="0">
+            <a:schemeClr val="accent1"/>
+          </a:effectRef>
+          <a:fontRef idx="minor">
+            <a:schemeClr val="tx1"/>
+          </a:fontRef>
+        </p:style>
+      </p:cxnSp>
+      <p:sp>
+        <p:nvSpPr>
+          <p:cNvPr id="30" name="Textfeld 29">
+            <a:extLst>
+              <a:ext uri="{FF2B5EF4-FFF2-40B4-BE49-F238E27FC236}">
+                <a16:creationId xmlns:a16="http://schemas.microsoft.com/office/drawing/2014/main" id="{D0B77E4E-85F8-B531-8E16-88D9E97652BE}"/>
+              </a:ext>
+            </a:extLst>
+          </p:cNvPr>
+          <p:cNvSpPr txBox="1"/>
+          <p:nvPr/>
+        </p:nvSpPr>
+        <p:spPr>
+          <a:xfrm>
+            <a:off x="5394995" y="3035577"/>
+            <a:ext cx="984565" cy="369332"/>
+          </a:xfrm>
+          <a:prstGeom prst="rect">
+            <a:avLst/>
+          </a:prstGeom>
+          <a:noFill/>
+        </p:spPr>
+        <p:txBody>
+          <a:bodyPr wrap="none" rtlCol="0">
+            <a:spAutoFit/>
+          </a:bodyPr>
+          <a:lstStyle/>
+          <a:p>
+            <a:r>
+              <a:rPr lang="de-DE" dirty="0"/>
+              <a:t>Queue 1</a:t>
+            </a:r>
+          </a:p>
+        </p:txBody>
+      </p:sp>
+      <p:sp>
+        <p:nvSpPr>
+          <p:cNvPr id="31" name="Textfeld 30">
+            <a:extLst>
+              <a:ext uri="{FF2B5EF4-FFF2-40B4-BE49-F238E27FC236}">
+                <a16:creationId xmlns:a16="http://schemas.microsoft.com/office/drawing/2014/main" id="{B7E817E1-4914-A156-69E2-9DFF68D970BF}"/>
+              </a:ext>
+            </a:extLst>
+          </p:cNvPr>
+          <p:cNvSpPr txBox="1"/>
+          <p:nvPr/>
+        </p:nvSpPr>
+        <p:spPr>
+          <a:xfrm>
+            <a:off x="5394994" y="4236829"/>
+            <a:ext cx="984565" cy="369332"/>
+          </a:xfrm>
+          <a:prstGeom prst="rect">
+            <a:avLst/>
+          </a:prstGeom>
+          <a:noFill/>
+        </p:spPr>
+        <p:txBody>
+          <a:bodyPr wrap="none" rtlCol="0">
+            <a:spAutoFit/>
+          </a:bodyPr>
+          <a:lstStyle/>
+          <a:p>
+            <a:r>
+              <a:rPr lang="de-DE" dirty="0"/>
+              <a:t>Queue 2</a:t>
+            </a:r>
+          </a:p>
+        </p:txBody>
+      </p:sp>
+      <p:sp>
+        <p:nvSpPr>
+          <p:cNvPr id="32" name="Rechteck: abgerundete Ecken 31">
+            <a:extLst>
+              <a:ext uri="{FF2B5EF4-FFF2-40B4-BE49-F238E27FC236}">
+                <a16:creationId xmlns:a16="http://schemas.microsoft.com/office/drawing/2014/main" id="{817059F6-0B6F-9E4E-A763-8F4B916658E8}"/>
+              </a:ext>
+            </a:extLst>
+          </p:cNvPr>
+          <p:cNvSpPr/>
+          <p:nvPr/>
+        </p:nvSpPr>
+        <p:spPr>
+          <a:xfrm>
+            <a:off x="1511300" y="5433115"/>
+            <a:ext cx="2057400" cy="575917"/>
+          </a:xfrm>
+          <a:prstGeom prst="roundRect">
+            <a:avLst/>
+          </a:prstGeom>
+        </p:spPr>
+        <p:style>
+          <a:lnRef idx="2">
+            <a:schemeClr val="accent1">
+              <a:shade val="15000"/>
+            </a:schemeClr>
+          </a:lnRef>
+          <a:fillRef idx="1">
+            <a:schemeClr val="accent1"/>
+          </a:fillRef>
+          <a:effectRef idx="0">
+            <a:schemeClr val="accent1"/>
+          </a:effectRef>
+          <a:fontRef idx="minor">
+            <a:schemeClr val="lt1"/>
+          </a:fontRef>
+        </p:style>
+        <p:txBody>
+          <a:bodyPr rtlCol="0" anchor="ctr"/>
+          <a:lstStyle/>
+          <a:p>
+            <a:pPr algn="ctr"/>
+            <a:r>
+              <a:rPr lang="de-DE" dirty="0"/>
+              <a:t>Producer 4</a:t>
+            </a:r>
+          </a:p>
+        </p:txBody>
+      </p:sp>
+      <p:sp>
+        <p:nvSpPr>
+          <p:cNvPr id="33" name="Flussdiagramm: Datenträger mit direktem Zugriff 32">
+            <a:extLst>
+              <a:ext uri="{FF2B5EF4-FFF2-40B4-BE49-F238E27FC236}">
+                <a16:creationId xmlns:a16="http://schemas.microsoft.com/office/drawing/2014/main" id="{9BEEBCD0-1BF0-2357-1D40-700B8AD551D2}"/>
+              </a:ext>
+            </a:extLst>
+          </p:cNvPr>
+          <p:cNvSpPr/>
+          <p:nvPr/>
+        </p:nvSpPr>
+        <p:spPr>
+          <a:xfrm>
+            <a:off x="4956313" y="4854376"/>
+            <a:ext cx="1994452" cy="622852"/>
+          </a:xfrm>
+          <a:prstGeom prst="flowChartMagneticDrum">
+            <a:avLst/>
+          </a:prstGeom>
+        </p:spPr>
+        <p:style>
+          <a:lnRef idx="2">
+            <a:schemeClr val="accent4">
+              <a:shade val="15000"/>
+            </a:schemeClr>
+          </a:lnRef>
+          <a:fillRef idx="1">
+            <a:schemeClr val="accent4"/>
+          </a:fillRef>
+          <a:effectRef idx="0">
+            <a:schemeClr val="accent4"/>
+          </a:effectRef>
+          <a:fontRef idx="minor">
+            <a:schemeClr val="lt1"/>
+          </a:fontRef>
+        </p:style>
+        <p:txBody>
+          <a:bodyPr rtlCol="0" anchor="ctr"/>
+          <a:lstStyle/>
+          <a:p>
+            <a:pPr algn="ctr"/>
+            <a:endParaRPr lang="de-DE"/>
+          </a:p>
+        </p:txBody>
+      </p:sp>
+      <p:sp>
+        <p:nvSpPr>
+          <p:cNvPr id="34" name="Textfeld 33">
+            <a:extLst>
+              <a:ext uri="{FF2B5EF4-FFF2-40B4-BE49-F238E27FC236}">
+                <a16:creationId xmlns:a16="http://schemas.microsoft.com/office/drawing/2014/main" id="{5D531852-433B-6CB2-C4E4-665CD62FD26D}"/>
+              </a:ext>
+            </a:extLst>
+          </p:cNvPr>
+          <p:cNvSpPr txBox="1"/>
+          <p:nvPr/>
+        </p:nvSpPr>
+        <p:spPr>
+          <a:xfrm>
+            <a:off x="5394994" y="5479711"/>
+            <a:ext cx="984565" cy="369332"/>
+          </a:xfrm>
+          <a:prstGeom prst="rect">
+            <a:avLst/>
+          </a:prstGeom>
+          <a:noFill/>
+        </p:spPr>
+        <p:txBody>
+          <a:bodyPr wrap="none" rtlCol="0">
+            <a:spAutoFit/>
+          </a:bodyPr>
+          <a:lstStyle/>
+          <a:p>
+            <a:r>
+              <a:rPr lang="de-DE" dirty="0"/>
+              <a:t>Queue 3</a:t>
+            </a:r>
+          </a:p>
+        </p:txBody>
+      </p:sp>
+      <p:sp>
+        <p:nvSpPr>
+          <p:cNvPr id="35" name="Rechteck: abgerundete Ecken 34">
+            <a:extLst>
+              <a:ext uri="{FF2B5EF4-FFF2-40B4-BE49-F238E27FC236}">
+                <a16:creationId xmlns:a16="http://schemas.microsoft.com/office/drawing/2014/main" id="{3FCEC5FD-5C6B-771B-7AF9-1E243EFE743A}"/>
+              </a:ext>
+            </a:extLst>
+          </p:cNvPr>
+          <p:cNvSpPr/>
+          <p:nvPr/>
+        </p:nvSpPr>
+        <p:spPr>
+          <a:xfrm>
+            <a:off x="8342243" y="5477228"/>
+            <a:ext cx="2057400" cy="575917"/>
+          </a:xfrm>
+          <a:prstGeom prst="roundRect">
+            <a:avLst/>
+          </a:prstGeom>
+        </p:spPr>
+        <p:style>
+          <a:lnRef idx="2">
+            <a:schemeClr val="accent6">
+              <a:shade val="15000"/>
+            </a:schemeClr>
+          </a:lnRef>
+          <a:fillRef idx="1">
+            <a:schemeClr val="accent6"/>
+          </a:fillRef>
+          <a:effectRef idx="0">
+            <a:schemeClr val="accent6"/>
+          </a:effectRef>
+          <a:fontRef idx="minor">
+            <a:schemeClr val="lt1"/>
+          </a:fontRef>
+        </p:style>
+        <p:txBody>
+          <a:bodyPr rtlCol="0" anchor="ctr"/>
+          <a:lstStyle/>
+          <a:p>
+            <a:pPr algn="ctr"/>
+            <a:r>
+              <a:rPr lang="de-DE" dirty="0"/>
+              <a:t>Consumer 3</a:t>
+            </a:r>
+          </a:p>
+        </p:txBody>
+      </p:sp>
+      <p:cxnSp>
+        <p:nvCxnSpPr>
+          <p:cNvPr id="36" name="Gerade Verbindung mit Pfeil 35">
+            <a:extLst>
+              <a:ext uri="{FF2B5EF4-FFF2-40B4-BE49-F238E27FC236}">
+                <a16:creationId xmlns:a16="http://schemas.microsoft.com/office/drawing/2014/main" id="{6E0054D4-A099-5466-F187-E93D1C810D0A}"/>
+              </a:ext>
+            </a:extLst>
+          </p:cNvPr>
+          <p:cNvCxnSpPr>
+            <a:cxnSpLocks/>
+            <a:stCxn id="32" idx="3"/>
+            <a:endCxn id="33" idx="1"/>
+          </p:cNvCxnSpPr>
+          <p:nvPr/>
+        </p:nvCxnSpPr>
+        <p:spPr>
+          <a:xfrm flipV="1">
+            <a:off x="3568700" y="5165802"/>
+            <a:ext cx="1387613" cy="555272"/>
+          </a:xfrm>
+          <a:prstGeom prst="straightConnector1">
+            <a:avLst/>
+          </a:prstGeom>
+          <a:ln>
+            <a:tailEnd type="triangle"/>
+          </a:ln>
+        </p:spPr>
+        <p:style>
+          <a:lnRef idx="1">
+            <a:schemeClr val="accent1"/>
+          </a:lnRef>
+          <a:fillRef idx="0">
+            <a:schemeClr val="accent1"/>
+          </a:fillRef>
+          <a:effectRef idx="0">
+            <a:schemeClr val="accent1"/>
+          </a:effectRef>
+          <a:fontRef idx="minor">
+            <a:schemeClr val="tx1"/>
+          </a:fontRef>
+        </p:style>
+      </p:cxnSp>
+      <p:cxnSp>
+        <p:nvCxnSpPr>
+          <p:cNvPr id="39" name="Gerade Verbindung mit Pfeil 38">
+            <a:extLst>
+              <a:ext uri="{FF2B5EF4-FFF2-40B4-BE49-F238E27FC236}">
+                <a16:creationId xmlns:a16="http://schemas.microsoft.com/office/drawing/2014/main" id="{D276A8BB-6CBC-1F5F-DD3D-593B98D5B0CF}"/>
+              </a:ext>
+            </a:extLst>
+          </p:cNvPr>
+          <p:cNvCxnSpPr>
+            <a:cxnSpLocks/>
+            <a:stCxn id="33" idx="4"/>
+            <a:endCxn id="35" idx="1"/>
+          </p:cNvCxnSpPr>
+          <p:nvPr/>
+        </p:nvCxnSpPr>
+        <p:spPr>
+          <a:xfrm>
+            <a:off x="6950765" y="5165802"/>
+            <a:ext cx="1391478" cy="599385"/>
+          </a:xfrm>
+          <a:prstGeom prst="straightConnector1">
+            <a:avLst/>
+          </a:prstGeom>
+          <a:ln>
+            <a:tailEnd type="triangle"/>
+          </a:ln>
+        </p:spPr>
+        <p:style>
+          <a:lnRef idx="1">
+            <a:schemeClr val="accent1"/>
+          </a:lnRef>
+          <a:fillRef idx="0">
+            <a:schemeClr val="accent1"/>
+          </a:fillRef>
+          <a:effectRef idx="0">
+            <a:schemeClr val="accent1"/>
+          </a:effectRef>
+          <a:fontRef idx="minor">
+            <a:schemeClr val="tx1"/>
+          </a:fontRef>
+        </p:style>
+      </p:cxnSp>
+    </p:spTree>
+    <p:extLst>
+      <p:ext uri="{BB962C8B-B14F-4D97-AF65-F5344CB8AC3E}">
+        <p14:creationId xmlns:p14="http://schemas.microsoft.com/office/powerpoint/2010/main" val="2256362387"/>
+      </p:ext>
+    </p:extLst>
+  </p:cSld>
+  <p:clrMapOvr>
+    <a:masterClrMapping/>
+  </p:clrMapOvr>
+</p:sld>
+</file>
+
+<file path=ppt/slides/slide55.xml><?xml version="1.0" encoding="utf-8"?>
+<p:sld xmlns:a="http://schemas.openxmlformats.org/drawingml/2006/main" xmlns:r="http://schemas.openxmlformats.org/officeDocument/2006/relationships" xmlns:p="http://schemas.openxmlformats.org/presentationml/2006/main">
+  <p:cSld>
+    <p:spTree>
+      <p:nvGrpSpPr>
+        <p:cNvPr id="1" name=""/>
+        <p:cNvGrpSpPr/>
+        <p:nvPr/>
+      </p:nvGrpSpPr>
+      <p:grpSpPr>
+        <a:xfrm>
+          <a:off x="0" y="0"/>
+          <a:ext cx="0" cy="0"/>
+          <a:chOff x="0" y="0"/>
+          <a:chExt cx="0" cy="0"/>
+        </a:xfrm>
+      </p:grpSpPr>
+      <p:sp>
+        <p:nvSpPr>
+          <p:cNvPr id="2" name="Titel 1">
+            <a:extLst>
+              <a:ext uri="{FF2B5EF4-FFF2-40B4-BE49-F238E27FC236}">
                 <a16:creationId xmlns:a16="http://schemas.microsoft.com/office/drawing/2014/main" id="{0EC7A146-A8F2-A844-9033-A0ACC828AF47}"/>
               </a:ext>
             </a:extLst>

</xml_diff>